<commit_message>
- Added HuC6280 - Fixed and changed "Partial Reserve" feature for GBA ( and HuC6280 ).
</commit_message>
<xml_diff>
--- a/src/mamidimemo/Data/Images.pptx
+++ b/src/mamidimemo/Data/Images.pptx
@@ -199,7 +199,7 @@
           <a:p>
             <a:fld id="{FD0ADE19-EE5F-4EAE-BCEC-0B5F9244BB48}" type="datetimeFigureOut">
               <a:rPr kumimoji="1" lang="ja-JP" altLang="en-US" smtClean="0"/>
-              <a:t>2019/9/29</a:t>
+              <a:t>2019/12/14</a:t>
             </a:fld>
             <a:endParaRPr kumimoji="1" lang="ja-JP" altLang="en-US"/>
           </a:p>
@@ -729,7 +729,7 @@
           <a:p>
             <a:fld id="{B7E48A73-9369-4B88-BBE6-B1D33CBD5F01}" type="datetimeFigureOut">
               <a:rPr kumimoji="1" lang="ja-JP" altLang="en-US" smtClean="0"/>
-              <a:t>2019/9/29</a:t>
+              <a:t>2019/12/14</a:t>
             </a:fld>
             <a:endParaRPr kumimoji="1" lang="ja-JP" altLang="en-US"/>
           </a:p>
@@ -959,7 +959,7 @@
           <a:p>
             <a:fld id="{B7E48A73-9369-4B88-BBE6-B1D33CBD5F01}" type="datetimeFigureOut">
               <a:rPr kumimoji="1" lang="ja-JP" altLang="en-US" smtClean="0"/>
-              <a:t>2019/9/29</a:t>
+              <a:t>2019/12/14</a:t>
             </a:fld>
             <a:endParaRPr kumimoji="1" lang="ja-JP" altLang="en-US"/>
           </a:p>
@@ -1199,7 +1199,7 @@
           <a:p>
             <a:fld id="{B7E48A73-9369-4B88-BBE6-B1D33CBD5F01}" type="datetimeFigureOut">
               <a:rPr kumimoji="1" lang="ja-JP" altLang="en-US" smtClean="0"/>
-              <a:t>2019/9/29</a:t>
+              <a:t>2019/12/14</a:t>
             </a:fld>
             <a:endParaRPr kumimoji="1" lang="ja-JP" altLang="en-US"/>
           </a:p>
@@ -1429,7 +1429,7 @@
           <a:p>
             <a:fld id="{B7E48A73-9369-4B88-BBE6-B1D33CBD5F01}" type="datetimeFigureOut">
               <a:rPr kumimoji="1" lang="ja-JP" altLang="en-US" smtClean="0"/>
-              <a:t>2019/9/29</a:t>
+              <a:t>2019/12/14</a:t>
             </a:fld>
             <a:endParaRPr kumimoji="1" lang="ja-JP" altLang="en-US"/>
           </a:p>
@@ -1704,7 +1704,7 @@
           <a:p>
             <a:fld id="{B7E48A73-9369-4B88-BBE6-B1D33CBD5F01}" type="datetimeFigureOut">
               <a:rPr kumimoji="1" lang="ja-JP" altLang="en-US" smtClean="0"/>
-              <a:t>2019/9/29</a:t>
+              <a:t>2019/12/14</a:t>
             </a:fld>
             <a:endParaRPr kumimoji="1" lang="ja-JP" altLang="en-US"/>
           </a:p>
@@ -2033,7 +2033,7 @@
           <a:p>
             <a:fld id="{B7E48A73-9369-4B88-BBE6-B1D33CBD5F01}" type="datetimeFigureOut">
               <a:rPr kumimoji="1" lang="ja-JP" altLang="en-US" smtClean="0"/>
-              <a:t>2019/9/29</a:t>
+              <a:t>2019/12/14</a:t>
             </a:fld>
             <a:endParaRPr kumimoji="1" lang="ja-JP" altLang="en-US"/>
           </a:p>
@@ -2509,7 +2509,7 @@
           <a:p>
             <a:fld id="{B7E48A73-9369-4B88-BBE6-B1D33CBD5F01}" type="datetimeFigureOut">
               <a:rPr kumimoji="1" lang="ja-JP" altLang="en-US" smtClean="0"/>
-              <a:t>2019/9/29</a:t>
+              <a:t>2019/12/14</a:t>
             </a:fld>
             <a:endParaRPr kumimoji="1" lang="ja-JP" altLang="en-US"/>
           </a:p>
@@ -2650,7 +2650,7 @@
           <a:p>
             <a:fld id="{B7E48A73-9369-4B88-BBE6-B1D33CBD5F01}" type="datetimeFigureOut">
               <a:rPr kumimoji="1" lang="ja-JP" altLang="en-US" smtClean="0"/>
-              <a:t>2019/9/29</a:t>
+              <a:t>2019/12/14</a:t>
             </a:fld>
             <a:endParaRPr kumimoji="1" lang="ja-JP" altLang="en-US"/>
           </a:p>
@@ -2763,7 +2763,7 @@
           <a:p>
             <a:fld id="{B7E48A73-9369-4B88-BBE6-B1D33CBD5F01}" type="datetimeFigureOut">
               <a:rPr kumimoji="1" lang="ja-JP" altLang="en-US" smtClean="0"/>
-              <a:t>2019/9/29</a:t>
+              <a:t>2019/12/14</a:t>
             </a:fld>
             <a:endParaRPr kumimoji="1" lang="ja-JP" altLang="en-US"/>
           </a:p>
@@ -3106,7 +3106,7 @@
           <a:p>
             <a:fld id="{B7E48A73-9369-4B88-BBE6-B1D33CBD5F01}" type="datetimeFigureOut">
               <a:rPr kumimoji="1" lang="ja-JP" altLang="en-US" smtClean="0"/>
-              <a:t>2019/9/29</a:t>
+              <a:t>2019/12/14</a:t>
             </a:fld>
             <a:endParaRPr kumimoji="1" lang="ja-JP" altLang="en-US"/>
           </a:p>
@@ -3394,7 +3394,7 @@
           <a:p>
             <a:fld id="{B7E48A73-9369-4B88-BBE6-B1D33CBD5F01}" type="datetimeFigureOut">
               <a:rPr kumimoji="1" lang="ja-JP" altLang="en-US" smtClean="0"/>
-              <a:t>2019/9/29</a:t>
+              <a:t>2019/12/14</a:t>
             </a:fld>
             <a:endParaRPr kumimoji="1" lang="ja-JP" altLang="en-US"/>
           </a:p>
@@ -3667,7 +3667,7 @@
           <a:p>
             <a:fld id="{B7E48A73-9369-4B88-BBE6-B1D33CBD5F01}" type="datetimeFigureOut">
               <a:rPr kumimoji="1" lang="ja-JP" altLang="en-US" smtClean="0"/>
-              <a:t>2019/9/29</a:t>
+              <a:t>2019/12/14</a:t>
             </a:fld>
             <a:endParaRPr kumimoji="1" lang="ja-JP" altLang="en-US"/>
           </a:p>
@@ -31887,7 +31887,7 @@
         </p:nvGrpSpPr>
         <p:grpSpPr>
           <a:xfrm>
-            <a:off x="7761136" y="3490265"/>
+            <a:off x="7468701" y="682897"/>
             <a:ext cx="2377153" cy="1338200"/>
             <a:chOff x="7761136" y="3490265"/>
             <a:chExt cx="2377153" cy="1338200"/>
@@ -32326,6 +32326,485 @@
           </p:txBody>
         </p:sp>
       </p:grpSp>
+      <p:pic>
+        <p:nvPicPr>
+          <p:cNvPr id="1129" name="Picture 105" descr="「pcエンジン ロゴ」の画像検索結果&quot;">
+            <a:extLst>
+              <a:ext uri="{FF2B5EF4-FFF2-40B4-BE49-F238E27FC236}">
+                <a16:creationId xmlns:a16="http://schemas.microsoft.com/office/drawing/2014/main" id="{7F5550D6-4D8C-4D7D-B71F-8B7C41223A11}"/>
+              </a:ext>
+            </a:extLst>
+          </p:cNvPr>
+          <p:cNvPicPr>
+            <a:picLocks noChangeAspect="1" noChangeArrowheads="1"/>
+          </p:cNvPicPr>
+          <p:nvPr/>
+        </p:nvPicPr>
+        <p:blipFill>
+          <a:blip r:embed="rId2">
+            <a:extLst>
+              <a:ext uri="{28A0092B-C50C-407E-A947-70E740481C1C}">
+                <a14:useLocalDpi xmlns:a14="http://schemas.microsoft.com/office/drawing/2010/main" val="0"/>
+              </a:ext>
+            </a:extLst>
+          </a:blip>
+          <a:stretch>
+            <a:fillRect/>
+          </a:stretch>
+        </p:blipFill>
+        <p:spPr bwMode="auto">
+          <a:xfrm>
+            <a:off x="7319473" y="3834663"/>
+            <a:ext cx="4572000" cy="3429000"/>
+          </a:xfrm>
+          <a:prstGeom prst="rect">
+            <a:avLst/>
+          </a:prstGeom>
+          <a:noFill/>
+          <a:extLst>
+            <a:ext uri="{909E8E84-426E-40DD-AFC4-6F175D3DCCD1}">
+              <a14:hiddenFill xmlns:a14="http://schemas.microsoft.com/office/drawing/2010/main">
+                <a:solidFill>
+                  <a:srgbClr val="FFFFFF"/>
+                </a:solidFill>
+              </a14:hiddenFill>
+            </a:ext>
+          </a:extLst>
+        </p:spPr>
+      </p:pic>
+      <p:grpSp>
+        <p:nvGrpSpPr>
+          <p:cNvPr id="1106" name="グループ化 1105">
+            <a:extLst>
+              <a:ext uri="{FF2B5EF4-FFF2-40B4-BE49-F238E27FC236}">
+                <a16:creationId xmlns:a16="http://schemas.microsoft.com/office/drawing/2014/main" id="{54A6AD08-2A49-414B-AA8F-B215B75280F5}"/>
+              </a:ext>
+            </a:extLst>
+          </p:cNvPr>
+          <p:cNvGrpSpPr/>
+          <p:nvPr/>
+        </p:nvGrpSpPr>
+        <p:grpSpPr>
+          <a:xfrm>
+            <a:off x="3972111" y="4743288"/>
+            <a:ext cx="2977454" cy="1475700"/>
+            <a:chOff x="5988250" y="4332798"/>
+            <a:chExt cx="2977454" cy="1475700"/>
+          </a:xfrm>
+        </p:grpSpPr>
+        <p:sp>
+          <p:nvSpPr>
+            <p:cNvPr id="145" name="正方形/長方形 144">
+              <a:extLst>
+                <a:ext uri="{FF2B5EF4-FFF2-40B4-BE49-F238E27FC236}">
+                  <a16:creationId xmlns:a16="http://schemas.microsoft.com/office/drawing/2014/main" id="{4F04E2C4-3A30-4C8C-869D-26426E81F2DC}"/>
+                </a:ext>
+              </a:extLst>
+            </p:cNvPr>
+            <p:cNvSpPr/>
+            <p:nvPr/>
+          </p:nvSpPr>
+          <p:spPr>
+            <a:xfrm>
+              <a:off x="5988250" y="4885168"/>
+              <a:ext cx="2977454" cy="923330"/>
+            </a:xfrm>
+            <a:prstGeom prst="rect">
+              <a:avLst/>
+            </a:prstGeom>
+          </p:spPr>
+          <p:txBody>
+            <a:bodyPr wrap="square">
+              <a:spAutoFit/>
+            </a:bodyPr>
+            <a:lstStyle/>
+            <a:p>
+              <a:pPr algn="ctr"/>
+              <a:r>
+                <a:rPr lang="en-US" altLang="ja-JP" sz="5400" dirty="0">
+                  <a:ln w="57150">
+                    <a:solidFill>
+                      <a:srgbClr val="FC412B"/>
+                    </a:solidFill>
+                  </a:ln>
+                  <a:solidFill>
+                    <a:schemeClr val="bg1"/>
+                  </a:solidFill>
+                  <a:effectLst>
+                    <a:outerShdw blurRad="38100" dist="19050" dir="2700000" algn="tl" rotWithShape="0">
+                      <a:schemeClr val="dk1">
+                        <a:alpha val="40000"/>
+                      </a:schemeClr>
+                    </a:outerShdw>
+                  </a:effectLst>
+                  <a:latin typeface="Mission GT-R Condensed" panose="02000500000000000000" pitchFamily="2" charset="0"/>
+                </a:rPr>
+                <a:t>6280</a:t>
+              </a:r>
+            </a:p>
+          </p:txBody>
+        </p:sp>
+        <p:sp>
+          <p:nvSpPr>
+            <p:cNvPr id="148" name="正方形/長方形 147">
+              <a:extLst>
+                <a:ext uri="{FF2B5EF4-FFF2-40B4-BE49-F238E27FC236}">
+                  <a16:creationId xmlns:a16="http://schemas.microsoft.com/office/drawing/2014/main" id="{4A32F7DF-D357-4D29-B056-1BAC76735517}"/>
+                </a:ext>
+              </a:extLst>
+            </p:cNvPr>
+            <p:cNvSpPr/>
+            <p:nvPr/>
+          </p:nvSpPr>
+          <p:spPr>
+            <a:xfrm>
+              <a:off x="5988250" y="4332798"/>
+              <a:ext cx="2977454" cy="923330"/>
+            </a:xfrm>
+            <a:prstGeom prst="rect">
+              <a:avLst/>
+            </a:prstGeom>
+          </p:spPr>
+          <p:txBody>
+            <a:bodyPr wrap="square">
+              <a:spAutoFit/>
+            </a:bodyPr>
+            <a:lstStyle/>
+            <a:p>
+              <a:pPr algn="ctr"/>
+              <a:r>
+                <a:rPr lang="en-US" altLang="ja-JP" sz="5400" dirty="0" err="1">
+                  <a:ln w="0"/>
+                  <a:solidFill>
+                    <a:srgbClr val="FC412B"/>
+                  </a:solidFill>
+                  <a:effectLst>
+                    <a:outerShdw blurRad="38100" dist="19050" dir="2700000" algn="tl" rotWithShape="0">
+                      <a:schemeClr val="dk1">
+                        <a:alpha val="40000"/>
+                      </a:schemeClr>
+                    </a:outerShdw>
+                  </a:effectLst>
+                  <a:latin typeface="Mission GT-R Condensed" panose="02000500000000000000" pitchFamily="2" charset="0"/>
+                </a:rPr>
+                <a:t>HuC</a:t>
+              </a:r>
+              <a:endParaRPr lang="en-US" altLang="ja-JP" sz="5400" dirty="0">
+                <a:ln w="0"/>
+                <a:solidFill>
+                  <a:srgbClr val="FC412B"/>
+                </a:solidFill>
+                <a:effectLst>
+                  <a:outerShdw blurRad="38100" dist="19050" dir="2700000" algn="tl" rotWithShape="0">
+                    <a:schemeClr val="dk1">
+                      <a:alpha val="40000"/>
+                    </a:schemeClr>
+                  </a:outerShdw>
+                </a:effectLst>
+                <a:latin typeface="Mission GT-R Condensed" panose="02000500000000000000" pitchFamily="2" charset="0"/>
+              </a:endParaRPr>
+            </a:p>
+          </p:txBody>
+        </p:sp>
+      </p:grpSp>
+      <p:sp>
+        <p:nvSpPr>
+          <p:cNvPr id="1105" name="楕円 1104">
+            <a:extLst>
+              <a:ext uri="{FF2B5EF4-FFF2-40B4-BE49-F238E27FC236}">
+                <a16:creationId xmlns:a16="http://schemas.microsoft.com/office/drawing/2014/main" id="{4D91C100-BD4A-4E9D-AE7E-42A07DF17172}"/>
+              </a:ext>
+            </a:extLst>
+          </p:cNvPr>
+          <p:cNvSpPr/>
+          <p:nvPr/>
+        </p:nvSpPr>
+        <p:spPr>
+          <a:xfrm rot="21013589">
+            <a:off x="8099623" y="3004858"/>
+            <a:ext cx="3352116" cy="1132410"/>
+          </a:xfrm>
+          <a:prstGeom prst="ellipse">
+            <a:avLst/>
+          </a:prstGeom>
+          <a:noFill/>
+          <a:ln w="38100">
+            <a:solidFill>
+              <a:srgbClr val="F73C26"/>
+            </a:solidFill>
+          </a:ln>
+        </p:spPr>
+        <p:style>
+          <a:lnRef idx="2">
+            <a:schemeClr val="accent1">
+              <a:shade val="50000"/>
+            </a:schemeClr>
+          </a:lnRef>
+          <a:fillRef idx="1">
+            <a:schemeClr val="accent1"/>
+          </a:fillRef>
+          <a:effectRef idx="0">
+            <a:schemeClr val="accent1"/>
+          </a:effectRef>
+          <a:fontRef idx="minor">
+            <a:schemeClr val="lt1"/>
+          </a:fontRef>
+        </p:style>
+        <p:txBody>
+          <a:bodyPr rtlCol="0" anchor="ctr"/>
+          <a:lstStyle/>
+          <a:p>
+            <a:pPr algn="ctr"/>
+            <a:endParaRPr kumimoji="1" lang="ja-JP" altLang="en-US"/>
+          </a:p>
+        </p:txBody>
+      </p:sp>
+      <p:sp>
+        <p:nvSpPr>
+          <p:cNvPr id="161" name="正方形/長方形 160">
+            <a:extLst>
+              <a:ext uri="{FF2B5EF4-FFF2-40B4-BE49-F238E27FC236}">
+                <a16:creationId xmlns:a16="http://schemas.microsoft.com/office/drawing/2014/main" id="{AF110217-FCAA-4873-B80B-859AAC426CF5}"/>
+              </a:ext>
+            </a:extLst>
+          </p:cNvPr>
+          <p:cNvSpPr/>
+          <p:nvPr/>
+        </p:nvSpPr>
+        <p:spPr>
+          <a:xfrm rot="20608585">
+            <a:off x="8843938" y="3687329"/>
+            <a:ext cx="898136" cy="554656"/>
+          </a:xfrm>
+          <a:prstGeom prst="rect">
+            <a:avLst/>
+          </a:prstGeom>
+          <a:solidFill>
+            <a:schemeClr val="bg1"/>
+          </a:solidFill>
+          <a:ln>
+            <a:noFill/>
+          </a:ln>
+        </p:spPr>
+        <p:style>
+          <a:lnRef idx="2">
+            <a:schemeClr val="accent1">
+              <a:shade val="50000"/>
+            </a:schemeClr>
+          </a:lnRef>
+          <a:fillRef idx="1">
+            <a:schemeClr val="accent1"/>
+          </a:fillRef>
+          <a:effectRef idx="0">
+            <a:schemeClr val="accent1"/>
+          </a:effectRef>
+          <a:fontRef idx="minor">
+            <a:schemeClr val="lt1"/>
+          </a:fontRef>
+        </p:style>
+        <p:txBody>
+          <a:bodyPr rtlCol="0" anchor="ctr"/>
+          <a:lstStyle/>
+          <a:p>
+            <a:pPr algn="ctr"/>
+            <a:endParaRPr kumimoji="1" lang="ja-JP" altLang="en-US"/>
+          </a:p>
+        </p:txBody>
+      </p:sp>
+      <p:sp>
+        <p:nvSpPr>
+          <p:cNvPr id="160" name="正方形/長方形 159">
+            <a:extLst>
+              <a:ext uri="{FF2B5EF4-FFF2-40B4-BE49-F238E27FC236}">
+                <a16:creationId xmlns:a16="http://schemas.microsoft.com/office/drawing/2014/main" id="{BBA42480-EE80-4B20-B8EB-6345B7E42867}"/>
+              </a:ext>
+            </a:extLst>
+          </p:cNvPr>
+          <p:cNvSpPr/>
+          <p:nvPr/>
+        </p:nvSpPr>
+        <p:spPr>
+          <a:xfrm>
+            <a:off x="8750376" y="2723219"/>
+            <a:ext cx="1869279" cy="662982"/>
+          </a:xfrm>
+          <a:prstGeom prst="rect">
+            <a:avLst/>
+          </a:prstGeom>
+          <a:solidFill>
+            <a:schemeClr val="bg1"/>
+          </a:solidFill>
+          <a:ln>
+            <a:noFill/>
+          </a:ln>
+        </p:spPr>
+        <p:style>
+          <a:lnRef idx="2">
+            <a:schemeClr val="accent1">
+              <a:shade val="50000"/>
+            </a:schemeClr>
+          </a:lnRef>
+          <a:fillRef idx="1">
+            <a:schemeClr val="accent1"/>
+          </a:fillRef>
+          <a:effectRef idx="0">
+            <a:schemeClr val="accent1"/>
+          </a:effectRef>
+          <a:fontRef idx="minor">
+            <a:schemeClr val="lt1"/>
+          </a:fontRef>
+        </p:style>
+        <p:txBody>
+          <a:bodyPr rtlCol="0" anchor="ctr"/>
+          <a:lstStyle/>
+          <a:p>
+            <a:pPr algn="ctr"/>
+            <a:endParaRPr kumimoji="1" lang="ja-JP" altLang="en-US"/>
+          </a:p>
+        </p:txBody>
+      </p:sp>
+      <p:sp>
+        <p:nvSpPr>
+          <p:cNvPr id="1107" name="正方形/長方形 1106">
+            <a:extLst>
+              <a:ext uri="{FF2B5EF4-FFF2-40B4-BE49-F238E27FC236}">
+                <a16:creationId xmlns:a16="http://schemas.microsoft.com/office/drawing/2014/main" id="{F77F684F-8303-4EF9-A99E-5E1F14878A2F}"/>
+              </a:ext>
+            </a:extLst>
+          </p:cNvPr>
+          <p:cNvSpPr/>
+          <p:nvPr/>
+        </p:nvSpPr>
+        <p:spPr>
+          <a:xfrm>
+            <a:off x="8386602" y="3834663"/>
+            <a:ext cx="756475" cy="690880"/>
+          </a:xfrm>
+          <a:prstGeom prst="rect">
+            <a:avLst/>
+          </a:prstGeom>
+          <a:solidFill>
+            <a:schemeClr val="bg1"/>
+          </a:solidFill>
+          <a:ln>
+            <a:noFill/>
+          </a:ln>
+        </p:spPr>
+        <p:style>
+          <a:lnRef idx="2">
+            <a:schemeClr val="accent1">
+              <a:shade val="50000"/>
+            </a:schemeClr>
+          </a:lnRef>
+          <a:fillRef idx="1">
+            <a:schemeClr val="accent1"/>
+          </a:fillRef>
+          <a:effectRef idx="0">
+            <a:schemeClr val="accent1"/>
+          </a:effectRef>
+          <a:fontRef idx="minor">
+            <a:schemeClr val="lt1"/>
+          </a:fontRef>
+        </p:style>
+        <p:txBody>
+          <a:bodyPr rtlCol="0" anchor="ctr"/>
+          <a:lstStyle/>
+          <a:p>
+            <a:pPr algn="ctr"/>
+            <a:endParaRPr kumimoji="1" lang="ja-JP" altLang="en-US"/>
+          </a:p>
+        </p:txBody>
+      </p:sp>
+      <p:pic>
+        <p:nvPicPr>
+          <p:cNvPr id="1110" name="図 1109">
+            <a:extLst>
+              <a:ext uri="{FF2B5EF4-FFF2-40B4-BE49-F238E27FC236}">
+                <a16:creationId xmlns:a16="http://schemas.microsoft.com/office/drawing/2014/main" id="{341AA22A-B36D-448A-983A-27DE88FBFC60}"/>
+              </a:ext>
+            </a:extLst>
+          </p:cNvPr>
+          <p:cNvPicPr>
+            <a:picLocks noChangeAspect="1"/>
+          </p:cNvPicPr>
+          <p:nvPr/>
+        </p:nvPicPr>
+        <p:blipFill>
+          <a:blip r:embed="rId3"/>
+          <a:stretch>
+            <a:fillRect/>
+          </a:stretch>
+        </p:blipFill>
+        <p:spPr>
+          <a:xfrm>
+            <a:off x="7748542" y="1798974"/>
+            <a:ext cx="3896618" cy="2904911"/>
+          </a:xfrm>
+          <a:prstGeom prst="rect">
+            <a:avLst/>
+          </a:prstGeom>
+          <a:scene3d>
+            <a:camera prst="isometricOffAxis1Right"/>
+            <a:lightRig rig="threePt" dir="t"/>
+          </a:scene3d>
+        </p:spPr>
+      </p:pic>
+      <p:sp>
+        <p:nvSpPr>
+          <p:cNvPr id="174" name="星: 4 pt 173">
+            <a:extLst>
+              <a:ext uri="{FF2B5EF4-FFF2-40B4-BE49-F238E27FC236}">
+                <a16:creationId xmlns:a16="http://schemas.microsoft.com/office/drawing/2014/main" id="{C49EAE5D-1636-4914-9F0F-2B50930A50FC}"/>
+              </a:ext>
+            </a:extLst>
+          </p:cNvPr>
+          <p:cNvSpPr/>
+          <p:nvPr/>
+        </p:nvSpPr>
+        <p:spPr>
+          <a:xfrm rot="3005734">
+            <a:off x="10322099" y="2530136"/>
+            <a:ext cx="512634" cy="1003424"/>
+          </a:xfrm>
+          <a:prstGeom prst="star4">
+            <a:avLst>
+              <a:gd name="adj" fmla="val 12817"/>
+            </a:avLst>
+          </a:prstGeom>
+          <a:solidFill>
+            <a:srgbClr val="FC412B"/>
+          </a:solidFill>
+          <a:ln>
+            <a:solidFill>
+              <a:schemeClr val="bg1"/>
+            </a:solidFill>
+          </a:ln>
+        </p:spPr>
+        <p:style>
+          <a:lnRef idx="2">
+            <a:schemeClr val="accent1">
+              <a:shade val="50000"/>
+            </a:schemeClr>
+          </a:lnRef>
+          <a:fillRef idx="1">
+            <a:schemeClr val="accent1"/>
+          </a:fillRef>
+          <a:effectRef idx="0">
+            <a:schemeClr val="accent1"/>
+          </a:effectRef>
+          <a:fontRef idx="minor">
+            <a:schemeClr val="lt1"/>
+          </a:fontRef>
+        </p:style>
+        <p:txBody>
+          <a:bodyPr rtlCol="0" anchor="ctr"/>
+          <a:lstStyle/>
+          <a:p>
+            <a:pPr algn="ctr"/>
+            <a:endParaRPr kumimoji="1" lang="ja-JP" altLang="en-US"/>
+          </a:p>
+        </p:txBody>
+      </p:sp>
     </p:spTree>
     <p:extLst>
       <p:ext uri="{BB962C8B-B14F-4D97-AF65-F5344CB8AC3E}">

</xml_diff>